<commit_message>
added pictures to powerpoint. Added some text to conclusion slide
</commit_message>
<xml_diff>
--- a/Case1.pptx
+++ b/Case1.pptx
@@ -220,6 +220,11 @@
       </a:defRPr>
     </a:lvl9pPr>
   </p:defaultTextStyle>
+  <p:extLst>
+    <p:ext uri="{EFAFB233-063F-42B5-8137-9DF3F51BA10A}">
+      <p15:sldGuideLst xmlns:p15="http://schemas.microsoft.com/office/powerpoint/2012/main"/>
+    </p:ext>
+  </p:extLst>
 </p:presentation>
 </file>
 
@@ -383,6 +388,11 @@
         </p:txBody>
       </p:sp>
     </p:spTree>
+    <p:extLst>
+      <p:ext uri="{BB962C8B-B14F-4D97-AF65-F5344CB8AC3E}">
+        <p14:creationId xmlns:p14="http://schemas.microsoft.com/office/powerpoint/2010/main" val="3199560630"/>
+      </p:ext>
+    </p:extLst>
   </p:cSld>
   <p:clrMap bg1="lt1" tx1="dk1" bg2="dk2" tx2="lt2" accent1="accent1" accent2="accent2" accent3="accent3" accent4="accent4" accent5="accent5" accent6="accent6" hlink="hlink" folHlink="folHlink"/>
   <p:notesStyle>
@@ -548,8 +558,8 @@
         </p:nvSpPr>
         <p:spPr>
           <a:xfrm>
-            <a:off x="1143225" y="685800"/>
-            <a:ext cx="4572225" cy="3429000"/>
+            <a:off x="381000" y="685800"/>
+            <a:ext cx="6096000" cy="3429000"/>
           </a:xfrm>
           <a:custGeom>
             <a:avLst/>
@@ -578,6 +588,11 @@
         </p:spPr>
       </p:sp>
     </p:spTree>
+    <p:extLst>
+      <p:ext uri="{BB962C8B-B14F-4D97-AF65-F5344CB8AC3E}">
+        <p14:creationId xmlns:p14="http://schemas.microsoft.com/office/powerpoint/2010/main" val="724236342"/>
+      </p:ext>
+    </p:extLst>
   </p:cSld>
   <p:clrMapOvr>
     <a:masterClrMapping/>
@@ -683,6 +698,11 @@
         </p:spPr>
       </p:sp>
     </p:spTree>
+    <p:extLst>
+      <p:ext uri="{BB962C8B-B14F-4D97-AF65-F5344CB8AC3E}">
+        <p14:creationId xmlns:p14="http://schemas.microsoft.com/office/powerpoint/2010/main" val="584933482"/>
+      </p:ext>
+    </p:extLst>
   </p:cSld>
   <p:clrMapOvr>
     <a:masterClrMapping/>
@@ -758,8 +778,8 @@
         </p:nvSpPr>
         <p:spPr>
           <a:xfrm>
-            <a:off x="1143225" y="685800"/>
-            <a:ext cx="4572225" cy="3429000"/>
+            <a:off x="381000" y="685800"/>
+            <a:ext cx="6096000" cy="3429000"/>
           </a:xfrm>
           <a:custGeom>
             <a:avLst/>
@@ -788,6 +808,11 @@
         </p:spPr>
       </p:sp>
     </p:spTree>
+    <p:extLst>
+      <p:ext uri="{BB962C8B-B14F-4D97-AF65-F5344CB8AC3E}">
+        <p14:creationId xmlns:p14="http://schemas.microsoft.com/office/powerpoint/2010/main" val="3000378062"/>
+      </p:ext>
+    </p:extLst>
   </p:cSld>
   <p:clrMapOvr>
     <a:masterClrMapping/>
@@ -893,6 +918,11 @@
         </p:spPr>
       </p:sp>
     </p:spTree>
+    <p:extLst>
+      <p:ext uri="{BB962C8B-B14F-4D97-AF65-F5344CB8AC3E}">
+        <p14:creationId xmlns:p14="http://schemas.microsoft.com/office/powerpoint/2010/main" val="269253392"/>
+      </p:ext>
+    </p:extLst>
   </p:cSld>
   <p:clrMapOvr>
     <a:masterClrMapping/>
@@ -998,6 +1028,11 @@
         </p:spPr>
       </p:sp>
     </p:spTree>
+    <p:extLst>
+      <p:ext uri="{BB962C8B-B14F-4D97-AF65-F5344CB8AC3E}">
+        <p14:creationId xmlns:p14="http://schemas.microsoft.com/office/powerpoint/2010/main" val="3492279469"/>
+      </p:ext>
+    </p:extLst>
   </p:cSld>
   <p:clrMapOvr>
     <a:masterClrMapping/>
@@ -1103,6 +1138,11 @@
         </p:spPr>
       </p:sp>
     </p:spTree>
+    <p:extLst>
+      <p:ext uri="{BB962C8B-B14F-4D97-AF65-F5344CB8AC3E}">
+        <p14:creationId xmlns:p14="http://schemas.microsoft.com/office/powerpoint/2010/main" val="1979871477"/>
+      </p:ext>
+    </p:extLst>
   </p:cSld>
   <p:clrMapOvr>
     <a:masterClrMapping/>
@@ -1178,8 +1218,8 @@
         </p:nvSpPr>
         <p:spPr>
           <a:xfrm>
-            <a:off x="1143225" y="685800"/>
-            <a:ext cx="4572225" cy="3429000"/>
+            <a:off x="381000" y="685800"/>
+            <a:ext cx="6096000" cy="3429000"/>
           </a:xfrm>
           <a:custGeom>
             <a:avLst/>
@@ -1208,6 +1248,11 @@
         </p:spPr>
       </p:sp>
     </p:spTree>
+    <p:extLst>
+      <p:ext uri="{BB962C8B-B14F-4D97-AF65-F5344CB8AC3E}">
+        <p14:creationId xmlns:p14="http://schemas.microsoft.com/office/powerpoint/2010/main" val="3152446779"/>
+      </p:ext>
+    </p:extLst>
   </p:cSld>
   <p:clrMapOvr>
     <a:masterClrMapping/>
@@ -12331,6 +12376,36 @@
           </a:p>
         </p:txBody>
       </p:sp>
+      <p:pic>
+        <p:nvPicPr>
+          <p:cNvPr id="2" name="Picture 1"/>
+          <p:cNvPicPr>
+            <a:picLocks noChangeAspect="1"/>
+          </p:cNvPicPr>
+          <p:nvPr/>
+        </p:nvPicPr>
+        <p:blipFill>
+          <a:blip r:embed="rId3">
+            <a:extLst>
+              <a:ext uri="{28A0092B-C50C-407E-A947-70E740481C1C}">
+                <a14:useLocalDpi xmlns:a14="http://schemas.microsoft.com/office/drawing/2010/main" val="0"/>
+              </a:ext>
+            </a:extLst>
+          </a:blip>
+          <a:stretch>
+            <a:fillRect/>
+          </a:stretch>
+        </p:blipFill>
+        <p:spPr>
+          <a:xfrm>
+            <a:off x="7940842" y="3445042"/>
+            <a:ext cx="2560721" cy="2560721"/>
+          </a:xfrm>
+          <a:prstGeom prst="rect">
+            <a:avLst/>
+          </a:prstGeom>
+        </p:spPr>
+      </p:pic>
     </p:spTree>
   </p:cSld>
   <p:clrMapOvr>
@@ -12570,6 +12645,13 @@
   <p:clrMapOvr>
     <a:masterClrMapping/>
   </p:clrMapOvr>
+  <p:timing>
+    <p:tnLst>
+      <p:par>
+        <p:cTn id="1" dur="indefinite" restart="never" nodeType="tmRoot"/>
+      </p:par>
+    </p:tnLst>
+  </p:timing>
 </p:sld>
 </file>
 
@@ -12695,7 +12777,7 @@
               <a:buChar char="•"/>
             </a:pPr>
             <a:r>
-              <a:rPr lang="en-US" sz="2000" b="0" i="0" u="none" strike="noStrike" cap="none">
+              <a:rPr lang="en-US" sz="2000" b="0" i="0" u="none" strike="noStrike" cap="none" dirty="0">
                 <a:solidFill>
                   <a:schemeClr val="dk1"/>
                 </a:solidFill>
@@ -12704,28 +12786,21 @@
                 <a:cs typeface="Cabin"/>
                 <a:sym typeface="Cabin"/>
               </a:rPr>
-              <a:t>Which emoji are used in the most popular tweets, and how does the inclusion of emoji contribute to their popularity?</a:t>
+              <a:t>Which emoji are used in the most popular tweets, and how does the inclusion of emoji contribute to their popularity</a:t>
             </a:r>
-          </a:p>
-          <a:p>
-            <a:pPr marL="228600" marR="0" lvl="0" indent="-228600" algn="l" rtl="0">
-              <a:lnSpc>
-                <a:spcPct val="120000"/>
-              </a:lnSpc>
-              <a:spcBef>
-                <a:spcPts val="1000"/>
-              </a:spcBef>
-              <a:spcAft>
-                <a:spcPts val="0"/>
-              </a:spcAft>
-              <a:buClr>
-                <a:schemeClr val="accent1"/>
-              </a:buClr>
-              <a:buSzPct val="100000"/>
-              <a:buFont typeface="Arial"/>
-              <a:buNone/>
-            </a:pPr>
-            <a:endParaRPr sz="2000" b="0" i="0" u="none" strike="noStrike" cap="none">
+            <a:r>
+              <a:rPr lang="en-US" sz="2000" b="0" i="0" u="none" strike="noStrike" cap="none" dirty="0" smtClean="0">
+                <a:solidFill>
+                  <a:schemeClr val="dk1"/>
+                </a:solidFill>
+                <a:latin typeface="Cabin"/>
+                <a:ea typeface="Cabin"/>
+                <a:cs typeface="Cabin"/>
+                <a:sym typeface="Cabin"/>
+              </a:rPr>
+              <a:t>?</a:t>
+            </a:r>
+            <a:endParaRPr sz="2000" b="0" i="0" u="none" strike="noStrike" cap="none" dirty="0">
               <a:solidFill>
                 <a:schemeClr val="dk1"/>
               </a:solidFill>
@@ -12754,7 +12829,7 @@
               <a:buChar char="•"/>
             </a:pPr>
             <a:r>
-              <a:rPr lang="en-US" sz="2000" b="0" i="0" u="none" strike="noStrike" cap="none">
+              <a:rPr lang="en-US" sz="2000" b="0" i="0" u="none" strike="noStrike" cap="none" dirty="0">
                 <a:solidFill>
                   <a:schemeClr val="dk1"/>
                 </a:solidFill>
@@ -12782,7 +12857,7 @@
               <a:buChar char="•"/>
             </a:pPr>
             <a:r>
-              <a:rPr lang="en-US" sz="2000" b="0" i="0" u="none" strike="noStrike" cap="none">
+              <a:rPr lang="en-US" sz="2000" b="0" i="0" u="none" strike="noStrike" cap="none" dirty="0">
                 <a:solidFill>
                   <a:schemeClr val="dk1"/>
                 </a:solidFill>
@@ -12796,11 +12871,48 @@
           </a:p>
         </p:txBody>
       </p:sp>
+      <p:pic>
+        <p:nvPicPr>
+          <p:cNvPr id="2" name="Picture 1"/>
+          <p:cNvPicPr>
+            <a:picLocks noChangeAspect="1"/>
+          </p:cNvPicPr>
+          <p:nvPr/>
+        </p:nvPicPr>
+        <p:blipFill>
+          <a:blip r:embed="rId3">
+            <a:extLst>
+              <a:ext uri="{28A0092B-C50C-407E-A947-70E740481C1C}">
+                <a14:useLocalDpi xmlns:a14="http://schemas.microsoft.com/office/drawing/2010/main" val="0"/>
+              </a:ext>
+            </a:extLst>
+          </a:blip>
+          <a:stretch>
+            <a:fillRect/>
+          </a:stretch>
+        </p:blipFill>
+        <p:spPr>
+          <a:xfrm>
+            <a:off x="8394192" y="3759113"/>
+            <a:ext cx="3797807" cy="3098887"/>
+          </a:xfrm>
+          <a:prstGeom prst="rect">
+            <a:avLst/>
+          </a:prstGeom>
+        </p:spPr>
+      </p:pic>
     </p:spTree>
   </p:cSld>
   <p:clrMapOvr>
     <a:masterClrMapping/>
   </p:clrMapOvr>
+  <p:timing>
+    <p:tnLst>
+      <p:par>
+        <p:cTn id="1" dur="indefinite" restart="never" nodeType="tmRoot"/>
+      </p:par>
+    </p:tnLst>
+  </p:timing>
 </p:sld>
 </file>
 
@@ -12949,6 +13061,13 @@
   <p:clrMapOvr>
     <a:masterClrMapping/>
   </p:clrMapOvr>
+  <p:timing>
+    <p:tnLst>
+      <p:par>
+        <p:cTn id="1" dur="indefinite" restart="never" nodeType="tmRoot"/>
+      </p:par>
+    </p:tnLst>
+  </p:timing>
 </p:sld>
 </file>
 
@@ -13388,21 +13507,56 @@
           </a:bodyPr>
           <a:lstStyle/>
           <a:p>
-            <a:pPr marL="228600" marR="0" lvl="0" indent="-228600" algn="l" rtl="0">
-              <a:lnSpc>
-                <a:spcPct val="120000"/>
-              </a:lnSpc>
-              <a:spcBef>
-                <a:spcPts val="0"/>
-              </a:spcBef>
-              <a:buClr>
-                <a:schemeClr val="accent1"/>
-              </a:buClr>
-              <a:buSzPct val="100000"/>
-              <a:buFont typeface="Arial"/>
-              <a:buNone/>
+            <a:pPr marL="342900" indent="-342900">
+              <a:spcBef>
+                <a:spcPts val="0"/>
+              </a:spcBef>
             </a:pPr>
-            <a:endParaRPr sz="2000" b="0" i="0" u="none" strike="noStrike" cap="none">
+            <a:r>
+              <a:rPr lang="en-US" sz="2000" b="0" i="0" u="none" strike="noStrike" cap="none" dirty="0" smtClean="0">
+                <a:solidFill>
+                  <a:schemeClr val="dk1"/>
+                </a:solidFill>
+                <a:latin typeface="Cabin"/>
+                <a:ea typeface="Cabin"/>
+                <a:cs typeface="Cabin"/>
+                <a:sym typeface="Cabin"/>
+              </a:rPr>
+              <a:t>Magic number of </a:t>
+            </a:r>
+            <a:r>
+              <a:rPr lang="en-US" sz="2000" b="0" i="0" u="none" strike="noStrike" cap="none" dirty="0" err="1" smtClean="0">
+                <a:solidFill>
+                  <a:schemeClr val="dk1"/>
+                </a:solidFill>
+                <a:latin typeface="Cabin"/>
+                <a:ea typeface="Cabin"/>
+                <a:cs typeface="Cabin"/>
+                <a:sym typeface="Cabin"/>
+              </a:rPr>
+              <a:t>emojis</a:t>
+            </a:r>
+            <a:r>
+              <a:rPr lang="en-US" sz="2000" b="0" i="0" u="none" strike="noStrike" cap="none" dirty="0" smtClean="0">
+                <a:solidFill>
+                  <a:schemeClr val="dk1"/>
+                </a:solidFill>
+                <a:latin typeface="Cabin"/>
+                <a:ea typeface="Cabin"/>
+                <a:cs typeface="Cabin"/>
+                <a:sym typeface="Cabin"/>
+              </a:rPr>
+              <a:t>: 3</a:t>
+            </a:r>
+            <a:endParaRPr lang="en-US" dirty="0" smtClean="0"/>
+          </a:p>
+          <a:p>
+            <a:pPr marL="342900" indent="-342900">
+              <a:spcBef>
+                <a:spcPts val="0"/>
+              </a:spcBef>
+            </a:pPr>
+            <a:endParaRPr lang="en-US" sz="2000" b="0" i="0" u="none" strike="noStrike" cap="none" dirty="0" smtClean="0">
               <a:solidFill>
                 <a:schemeClr val="dk1"/>
               </a:solidFill>
@@ -13414,6 +13568,36 @@
           </a:p>
         </p:txBody>
       </p:sp>
+      <p:pic>
+        <p:nvPicPr>
+          <p:cNvPr id="2" name="Picture 1"/>
+          <p:cNvPicPr>
+            <a:picLocks noChangeAspect="1"/>
+          </p:cNvPicPr>
+          <p:nvPr/>
+        </p:nvPicPr>
+        <p:blipFill>
+          <a:blip r:embed="rId3">
+            <a:extLst>
+              <a:ext uri="{28A0092B-C50C-407E-A947-70E740481C1C}">
+                <a14:useLocalDpi xmlns:a14="http://schemas.microsoft.com/office/drawing/2010/main" val="0"/>
+              </a:ext>
+            </a:extLst>
+          </a:blip>
+          <a:stretch>
+            <a:fillRect/>
+          </a:stretch>
+        </p:blipFill>
+        <p:spPr>
+          <a:xfrm>
+            <a:off x="8205216" y="1853753"/>
+            <a:ext cx="2438400" cy="2438400"/>
+          </a:xfrm>
+          <a:prstGeom prst="rect">
+            <a:avLst/>
+          </a:prstGeom>
+        </p:spPr>
+      </p:pic>
     </p:spTree>
   </p:cSld>
   <p:clrMapOvr>

</xml_diff>